<commit_message>
Started new experiment ESN_exp07_AggRel to try agglomerative relevance for ENSO
</commit_message>
<xml_diff>
--- a/ESN_exp06_ENSO.pptx
+++ b/ESN_exp06_ENSO.pptx
@@ -5,7 +5,7 @@
     <p:sldMasterId id="2147483648" r:id="rId1"/>
   </p:sldMasterIdLst>
   <p:notesMasterIdLst>
-    <p:notesMasterId r:id="rId22"/>
+    <p:notesMasterId r:id="rId23"/>
   </p:notesMasterIdLst>
   <p:sldIdLst>
     <p:sldId id="257" r:id="rId2"/>
@@ -27,7 +27,8 @@
     <p:sldId id="279" r:id="rId18"/>
     <p:sldId id="268" r:id="rId19"/>
     <p:sldId id="274" r:id="rId20"/>
-    <p:sldId id="269" r:id="rId21"/>
+    <p:sldId id="280" r:id="rId21"/>
+    <p:sldId id="269" r:id="rId22"/>
   </p:sldIdLst>
   <p:sldSz cx="12192000" cy="6858000"/>
   <p:notesSz cx="6858000" cy="9144000"/>
@@ -216,7 +217,7 @@
           <a:p>
             <a:fld id="{3AB76ABC-33D1-9C41-94E4-617AD2CE1B7F}" type="datetimeFigureOut">
               <a:rPr lang="de-DE" smtClean="0"/>
-              <a:t>06.03.22</a:t>
+              <a:t>07.03.22</a:t>
             </a:fld>
             <a:endParaRPr lang="de-DE"/>
           </a:p>
@@ -1133,7 +1134,7 @@
           <a:lstStyle/>
           <a:p>
             <a:fld id="{7BD4D8C3-7D46-0F49-B24C-EB77122FC604}" type="datetime1">
-              <a:t>06.03.22</a:t>
+              <a:t>07.03.22</a:t>
             </a:fld>
             <a:endParaRPr lang="de-DE"/>
           </a:p>
@@ -1330,7 +1331,7 @@
           <a:lstStyle/>
           <a:p>
             <a:fld id="{DB9C740B-A762-CC4F-8842-3B0709E16494}" type="datetime1">
-              <a:t>06.03.22</a:t>
+              <a:t>07.03.22</a:t>
             </a:fld>
             <a:endParaRPr lang="de-DE"/>
           </a:p>
@@ -1537,7 +1538,7 @@
           <a:lstStyle/>
           <a:p>
             <a:fld id="{B5DCEFDD-97F0-3F4E-856D-53E015FA5109}" type="datetime1">
-              <a:t>06.03.22</a:t>
+              <a:t>07.03.22</a:t>
             </a:fld>
             <a:endParaRPr lang="de-DE"/>
           </a:p>
@@ -1734,7 +1735,7 @@
           <a:lstStyle/>
           <a:p>
             <a:fld id="{B1266B10-EA18-AA4D-98CF-856740AC35F1}" type="datetime1">
-              <a:t>06.03.22</a:t>
+              <a:t>07.03.22</a:t>
             </a:fld>
             <a:endParaRPr lang="de-DE"/>
           </a:p>
@@ -2008,7 +2009,7 @@
           <a:lstStyle/>
           <a:p>
             <a:fld id="{7FCBA1CA-7E22-9747-8D35-F7D8EE0D09E4}" type="datetime1">
-              <a:t>06.03.22</a:t>
+              <a:t>07.03.22</a:t>
             </a:fld>
             <a:endParaRPr lang="de-DE"/>
           </a:p>
@@ -2272,7 +2273,7 @@
           <a:lstStyle/>
           <a:p>
             <a:fld id="{E385B954-90D5-F240-B297-4FE6A023436C}" type="datetime1">
-              <a:t>06.03.22</a:t>
+              <a:t>07.03.22</a:t>
             </a:fld>
             <a:endParaRPr lang="de-DE"/>
           </a:p>
@@ -2683,7 +2684,7 @@
           <a:lstStyle/>
           <a:p>
             <a:fld id="{132D93F8-6522-3547-A308-39305832D986}" type="datetime1">
-              <a:t>06.03.22</a:t>
+              <a:t>07.03.22</a:t>
             </a:fld>
             <a:endParaRPr lang="de-DE"/>
           </a:p>
@@ -2823,7 +2824,7 @@
           <a:lstStyle/>
           <a:p>
             <a:fld id="{2A9155E5-A07A-EF47-A0BA-443B784B7103}" type="datetime1">
-              <a:t>06.03.22</a:t>
+              <a:t>07.03.22</a:t>
             </a:fld>
             <a:endParaRPr lang="de-DE"/>
           </a:p>
@@ -2935,7 +2936,7 @@
           <a:lstStyle/>
           <a:p>
             <a:fld id="{405279BA-97B3-BC47-B977-FE53E0846046}" type="datetime1">
-              <a:t>06.03.22</a:t>
+              <a:t>07.03.22</a:t>
             </a:fld>
             <a:endParaRPr lang="de-DE"/>
           </a:p>
@@ -3245,7 +3246,7 @@
           <a:lstStyle/>
           <a:p>
             <a:fld id="{2CDFB09A-BAAD-7C43-B25A-805ABA21608B}" type="datetime1">
-              <a:t>06.03.22</a:t>
+              <a:t>07.03.22</a:t>
             </a:fld>
             <a:endParaRPr lang="de-DE"/>
           </a:p>
@@ -3532,7 +3533,7 @@
           <a:lstStyle/>
           <a:p>
             <a:fld id="{78138569-B3F3-7940-A5AE-D6935026A2BE}" type="datetime1">
-              <a:t>06.03.22</a:t>
+              <a:t>07.03.22</a:t>
             </a:fld>
             <a:endParaRPr lang="de-DE"/>
           </a:p>
@@ -3772,7 +3773,7 @@
           </a:lstStyle>
           <a:p>
             <a:fld id="{050D7DD1-F0AC-9F48-BEEF-9A8C75FA3F30}" type="datetime1">
-              <a:t>06.03.22</a:t>
+              <a:t>07.03.22</a:t>
             </a:fld>
             <a:endParaRPr lang="de-DE"/>
           </a:p>
@@ -8281,7 +8282,7 @@
         <p:spPr>
           <a:xfrm>
             <a:off x="543697" y="1112108"/>
-            <a:ext cx="10600553" cy="2862322"/>
+            <a:ext cx="10600553" cy="3416320"/>
           </a:xfrm>
           <a:prstGeom prst="rect">
             <a:avLst/>
@@ -8355,6 +8356,16 @@
             <a:r>
               <a:rPr lang="de-DE"/>
               <a:t>of parameter space.</a:t>
+            </a:r>
+          </a:p>
+          <a:p>
+            <a:pPr marL="285750" indent="-285750">
+              <a:buFont typeface="Courier New" panose="02070309020205020404" pitchFamily="49" charset="0"/>
+              <a:buChar char="o"/>
+            </a:pPr>
+            <a:r>
+              <a:rPr lang="de-DE"/>
+              <a:t>Challenge: How to find „suitable“ initial parameters? (see paper [Öztürk et al., 2020], they use fisher maximation)</a:t>
             </a:r>
           </a:p>
           <a:p>
@@ -11002,6 +11013,183 @@
             <a:fld id="{884D93BF-CEC1-484B-B797-4695C35961E3}" type="slidenum">
               <a:rPr lang="de-DE" smtClean="0"/>
               <a:t>20</a:t>
+            </a:fld>
+            <a:endParaRPr lang="de-DE"/>
+          </a:p>
+        </p:txBody>
+      </p:sp>
+      <p:sp>
+        <p:nvSpPr>
+          <p:cNvPr id="7" name="Textfeld 6">
+            <a:extLst>
+              <a:ext uri="{FF2B5EF4-FFF2-40B4-BE49-F238E27FC236}">
+                <a16:creationId xmlns:a16="http://schemas.microsoft.com/office/drawing/2014/main" id="{FF8A926B-8B78-834F-BFBA-9405321487C6}"/>
+              </a:ext>
+            </a:extLst>
+          </p:cNvPr>
+          <p:cNvSpPr txBox="1"/>
+          <p:nvPr/>
+        </p:nvSpPr>
+        <p:spPr>
+          <a:xfrm>
+            <a:off x="365768" y="302411"/>
+            <a:ext cx="8815301" cy="1661993"/>
+          </a:xfrm>
+          <a:prstGeom prst="rect">
+            <a:avLst/>
+          </a:prstGeom>
+          <a:noFill/>
+        </p:spPr>
+        <p:txBody>
+          <a:bodyPr wrap="square" rtlCol="0">
+            <a:spAutoFit/>
+          </a:bodyPr>
+          <a:lstStyle/>
+          <a:p>
+            <a:r>
+              <a:rPr lang="de-DE" sz="2400" b="1" dirty="0"/>
+              <a:t>First attempt: Agglomerative Relevance</a:t>
+            </a:r>
+          </a:p>
+          <a:p>
+            <a:endParaRPr lang="de-DE" sz="2400" b="1" dirty="0"/>
+          </a:p>
+          <a:p>
+            <a:pPr marL="285750" indent="-285750">
+              <a:buFont typeface="Arial" panose="020B0604020202020204" pitchFamily="34" charset="0"/>
+              <a:buChar char="•"/>
+            </a:pPr>
+            <a:r>
+              <a:rPr lang="de-DE" dirty="0"/>
+              <a:t>Looked for </a:t>
+            </a:r>
+            <a:r>
+              <a:rPr lang="de-DE" b="1" dirty="0"/>
+              <a:t>single sst timeseries </a:t>
+            </a:r>
+            <a:r>
+              <a:rPr lang="de-DE" dirty="0"/>
+              <a:t>that best predicts sst anomaly (= Nino events)</a:t>
+            </a:r>
+          </a:p>
+          <a:p>
+            <a:pPr marL="285750" indent="-285750">
+              <a:buFont typeface="Arial" panose="020B0604020202020204" pitchFamily="34" charset="0"/>
+              <a:buChar char="•"/>
+            </a:pPr>
+            <a:r>
+              <a:rPr lang="de-DE" dirty="0"/>
+              <a:t>Only considered gridpoints </a:t>
+            </a:r>
+            <a:r>
+              <a:rPr lang="de-DE" b="1" dirty="0"/>
+              <a:t>from Nino3.4 box</a:t>
+            </a:r>
+            <a:r>
+              <a:rPr lang="de-DE" dirty="0"/>
+              <a:t>.</a:t>
+            </a:r>
+          </a:p>
+          <a:p>
+            <a:pPr marL="285750" indent="-285750">
+              <a:buFont typeface="Arial" panose="020B0604020202020204" pitchFamily="34" charset="0"/>
+              <a:buChar char="•"/>
+            </a:pPr>
+            <a:r>
+              <a:rPr lang="de-DE" dirty="0">
+                <a:solidFill>
+                  <a:srgbClr val="FF0000"/>
+                </a:solidFill>
+              </a:rPr>
+              <a:t>target_length = 1</a:t>
+            </a:r>
+          </a:p>
+        </p:txBody>
+      </p:sp>
+      <p:pic>
+        <p:nvPicPr>
+          <p:cNvPr id="2" name="Grafik 1">
+            <a:extLst>
+              <a:ext uri="{FF2B5EF4-FFF2-40B4-BE49-F238E27FC236}">
+                <a16:creationId xmlns:a16="http://schemas.microsoft.com/office/drawing/2014/main" id="{D3182172-1656-EA47-A423-8FCF8D9DA710}"/>
+              </a:ext>
+            </a:extLst>
+          </p:cNvPr>
+          <p:cNvPicPr>
+            <a:picLocks noChangeAspect="1"/>
+          </p:cNvPicPr>
+          <p:nvPr/>
+        </p:nvPicPr>
+        <p:blipFill>
+          <a:blip r:embed="rId2"/>
+          <a:stretch>
+            <a:fillRect/>
+          </a:stretch>
+        </p:blipFill>
+        <p:spPr>
+          <a:xfrm>
+            <a:off x="2011748" y="2241550"/>
+            <a:ext cx="7797800" cy="4114800"/>
+          </a:xfrm>
+          <a:prstGeom prst="rect">
+            <a:avLst/>
+          </a:prstGeom>
+        </p:spPr>
+      </p:pic>
+    </p:spTree>
+    <p:extLst>
+      <p:ext uri="{BB962C8B-B14F-4D97-AF65-F5344CB8AC3E}">
+        <p14:creationId xmlns:p14="http://schemas.microsoft.com/office/powerpoint/2010/main" val="156861512"/>
+      </p:ext>
+    </p:extLst>
+  </p:cSld>
+  <p:clrMapOvr>
+    <a:masterClrMapping/>
+  </p:clrMapOvr>
+</p:sld>
+</file>
+
+<file path=ppt/slides/slide21.xml><?xml version="1.0" encoding="utf-8"?>
+<p:sld xmlns:a="http://schemas.openxmlformats.org/drawingml/2006/main" xmlns:r="http://schemas.openxmlformats.org/officeDocument/2006/relationships" xmlns:p="http://schemas.openxmlformats.org/presentationml/2006/main">
+  <p:cSld>
+    <p:spTree>
+      <p:nvGrpSpPr>
+        <p:cNvPr id="1" name=""/>
+        <p:cNvGrpSpPr/>
+        <p:nvPr/>
+      </p:nvGrpSpPr>
+      <p:grpSpPr>
+        <a:xfrm>
+          <a:off x="0" y="0"/>
+          <a:ext cx="0" cy="0"/>
+          <a:chOff x="0" y="0"/>
+          <a:chExt cx="0" cy="0"/>
+        </a:xfrm>
+      </p:grpSpPr>
+      <p:sp>
+        <p:nvSpPr>
+          <p:cNvPr id="4" name="Foliennummernplatzhalter 3">
+            <a:extLst>
+              <a:ext uri="{FF2B5EF4-FFF2-40B4-BE49-F238E27FC236}">
+                <a16:creationId xmlns:a16="http://schemas.microsoft.com/office/drawing/2014/main" id="{9752BF9B-20ED-124C-8D78-032D3F29C212}"/>
+              </a:ext>
+            </a:extLst>
+          </p:cNvPr>
+          <p:cNvSpPr>
+            <a:spLocks noGrp="1"/>
+          </p:cNvSpPr>
+          <p:nvPr>
+            <p:ph type="sldNum" sz="quarter" idx="12"/>
+          </p:nvPr>
+        </p:nvSpPr>
+        <p:spPr/>
+        <p:txBody>
+          <a:bodyPr/>
+          <a:lstStyle/>
+          <a:p>
+            <a:fld id="{884D93BF-CEC1-484B-B797-4695C35961E3}" type="slidenum">
+              <a:rPr lang="de-DE" smtClean="0"/>
+              <a:t>21</a:t>
             </a:fld>
             <a:endParaRPr lang="de-DE"/>
           </a:p>
@@ -22094,7 +22282,7 @@
         <p:spPr>
           <a:xfrm>
             <a:off x="543697" y="1112108"/>
-            <a:ext cx="11204958" cy="2862322"/>
+            <a:ext cx="11204958" cy="3970318"/>
           </a:xfrm>
           <a:prstGeom prst="rect">
             <a:avLst/>
@@ -22276,7 +22464,51 @@
                   <a:srgbClr val="0070C0"/>
                 </a:solidFill>
               </a:rPr>
-              <a:t>for specified target_length</a:t>
+              <a:t>for specified target_length.</a:t>
+            </a:r>
+          </a:p>
+          <a:p>
+            <a:pPr marL="742950" lvl="1" indent="-285750">
+              <a:buFont typeface="Courier New" panose="02070309020205020404" pitchFamily="49" charset="0"/>
+              <a:buChar char="o"/>
+            </a:pPr>
+            <a:r>
+              <a:rPr lang="de-DE"/>
+              <a:t>Simple comparision: gridsearch on 6 parameters with e.g. 10 disctings steps for each parameter means to try on </a:t>
+            </a:r>
+            <a:r>
+              <a:rPr lang="de-DE" b="1"/>
+              <a:t>10</a:t>
+            </a:r>
+            <a:r>
+              <a:rPr lang="de-DE" b="1" baseline="30000"/>
+              <a:t>6</a:t>
+            </a:r>
+            <a:r>
+              <a:rPr lang="de-DE" b="1"/>
+              <a:t> = 1.000.000 </a:t>
+            </a:r>
+            <a:r>
+              <a:rPr lang="de-DE"/>
+              <a:t>possible parameter settings.</a:t>
+            </a:r>
+          </a:p>
+          <a:p>
+            <a:pPr marL="742950" lvl="1" indent="-285750">
+              <a:buFont typeface="Courier New" panose="02070309020205020404" pitchFamily="49" charset="0"/>
+              <a:buChar char="o"/>
+            </a:pPr>
+            <a:r>
+              <a:rPr lang="de-DE"/>
+              <a:t>For gradient descent with e.g. 20 iterations on 6 parameters (up/down for each parameter individually) plus adjusted setting (all parameters adjusted simultaneously) requires 20 x (6 x 2 + 1) = </a:t>
+            </a:r>
+            <a:r>
+              <a:rPr lang="de-DE" b="1"/>
+              <a:t>260 possibilities</a:t>
+            </a:r>
+            <a:r>
+              <a:rPr lang="de-DE"/>
+              <a:t>.</a:t>
             </a:r>
           </a:p>
         </p:txBody>

</xml_diff>

<commit_message>
finished working on ESN experiments 06 and 07 for now, modified summarizing presentations
</commit_message>
<xml_diff>
--- a/ESN_exp06_ENSO.pptx
+++ b/ESN_exp06_ENSO.pptx
@@ -219,7 +219,7 @@
           <a:p>
             <a:fld id="{3AB76ABC-33D1-9C41-94E4-617AD2CE1B7F}" type="datetimeFigureOut">
               <a:rPr lang="de-DE" smtClean="0"/>
-              <a:t>09.03.22</a:t>
+              <a:t>10.03.22</a:t>
             </a:fld>
             <a:endParaRPr lang="de-DE"/>
           </a:p>
@@ -1136,7 +1136,7 @@
           <a:lstStyle/>
           <a:p>
             <a:fld id="{7BD4D8C3-7D46-0F49-B24C-EB77122FC604}" type="datetime1">
-              <a:t>09.03.22</a:t>
+              <a:t>10.03.22</a:t>
             </a:fld>
             <a:endParaRPr lang="de-DE"/>
           </a:p>
@@ -1333,7 +1333,7 @@
           <a:lstStyle/>
           <a:p>
             <a:fld id="{DB9C740B-A762-CC4F-8842-3B0709E16494}" type="datetime1">
-              <a:t>09.03.22</a:t>
+              <a:t>10.03.22</a:t>
             </a:fld>
             <a:endParaRPr lang="de-DE"/>
           </a:p>
@@ -1540,7 +1540,7 @@
           <a:lstStyle/>
           <a:p>
             <a:fld id="{B5DCEFDD-97F0-3F4E-856D-53E015FA5109}" type="datetime1">
-              <a:t>09.03.22</a:t>
+              <a:t>10.03.22</a:t>
             </a:fld>
             <a:endParaRPr lang="de-DE"/>
           </a:p>
@@ -1737,7 +1737,7 @@
           <a:lstStyle/>
           <a:p>
             <a:fld id="{B1266B10-EA18-AA4D-98CF-856740AC35F1}" type="datetime1">
-              <a:t>09.03.22</a:t>
+              <a:t>10.03.22</a:t>
             </a:fld>
             <a:endParaRPr lang="de-DE"/>
           </a:p>
@@ -2011,7 +2011,7 @@
           <a:lstStyle/>
           <a:p>
             <a:fld id="{7FCBA1CA-7E22-9747-8D35-F7D8EE0D09E4}" type="datetime1">
-              <a:t>09.03.22</a:t>
+              <a:t>10.03.22</a:t>
             </a:fld>
             <a:endParaRPr lang="de-DE"/>
           </a:p>
@@ -2275,7 +2275,7 @@
           <a:lstStyle/>
           <a:p>
             <a:fld id="{E385B954-90D5-F240-B297-4FE6A023436C}" type="datetime1">
-              <a:t>09.03.22</a:t>
+              <a:t>10.03.22</a:t>
             </a:fld>
             <a:endParaRPr lang="de-DE"/>
           </a:p>
@@ -2686,7 +2686,7 @@
           <a:lstStyle/>
           <a:p>
             <a:fld id="{132D93F8-6522-3547-A308-39305832D986}" type="datetime1">
-              <a:t>09.03.22</a:t>
+              <a:t>10.03.22</a:t>
             </a:fld>
             <a:endParaRPr lang="de-DE"/>
           </a:p>
@@ -2826,7 +2826,7 @@
           <a:lstStyle/>
           <a:p>
             <a:fld id="{2A9155E5-A07A-EF47-A0BA-443B784B7103}" type="datetime1">
-              <a:t>09.03.22</a:t>
+              <a:t>10.03.22</a:t>
             </a:fld>
             <a:endParaRPr lang="de-DE"/>
           </a:p>
@@ -2938,7 +2938,7 @@
           <a:lstStyle/>
           <a:p>
             <a:fld id="{405279BA-97B3-BC47-B977-FE53E0846046}" type="datetime1">
-              <a:t>09.03.22</a:t>
+              <a:t>10.03.22</a:t>
             </a:fld>
             <a:endParaRPr lang="de-DE"/>
           </a:p>
@@ -3248,7 +3248,7 @@
           <a:lstStyle/>
           <a:p>
             <a:fld id="{2CDFB09A-BAAD-7C43-B25A-805ABA21608B}" type="datetime1">
-              <a:t>09.03.22</a:t>
+              <a:t>10.03.22</a:t>
             </a:fld>
             <a:endParaRPr lang="de-DE"/>
           </a:p>
@@ -3535,7 +3535,7 @@
           <a:lstStyle/>
           <a:p>
             <a:fld id="{78138569-B3F3-7940-A5AE-D6935026A2BE}" type="datetime1">
-              <a:t>09.03.22</a:t>
+              <a:t>10.03.22</a:t>
             </a:fld>
             <a:endParaRPr lang="de-DE"/>
           </a:p>
@@ -3775,7 +3775,7 @@
           </a:lstStyle>
           <a:p>
             <a:fld id="{050D7DD1-F0AC-9F48-BEEF-9A8C75FA3F30}" type="datetime1">
-              <a:t>09.03.22</a:t>
+              <a:t>10.03.22</a:t>
             </a:fld>
             <a:endParaRPr lang="de-DE"/>
           </a:p>
@@ -24091,7 +24091,7 @@
             </a:pPr>
             <a:r>
               <a:rPr lang="de-DE"/>
-              <a:t>Simple comparision: gridsearch on 6 parameters with e.g. 10 disctings steps for each parameter means to try on </a:t>
+              <a:t>Simple comparision: gridsearch on 6 parameters with e.g. 10 distinct steps for each parameter means to try on </a:t>
             </a:r>
             <a:r>
               <a:rPr lang="de-DE" b="1"/>

</xml_diff>